<commit_message>
this is the final code for techno event
</commit_message>
<xml_diff>
--- a/rules.pptx
+++ b/rules.pptx
@@ -6523,6 +6523,16 @@
             <a:pPr marL="0" indent="0">
               <a:buNone/>
             </a:pPr>
+            <a:r>
+              <a:rPr lang="en-US" dirty="0" smtClean="0"/>
+              <a:t>if you win ,50 pts</a:t>
+            </a:r>
+            <a:endParaRPr lang="en-US" dirty="0" smtClean="0"/>
+          </a:p>
+          <a:p>
+            <a:pPr marL="0" indent="0">
+              <a:buNone/>
+            </a:pPr>
             <a:endParaRPr lang="en-US" dirty="0" smtClean="0"/>
           </a:p>
         </p:txBody>
@@ -6861,6 +6871,67 @@
                                           <p:spTgt spid="2">
                                             <p:txEl>
                                               <p:pRg st="5" end="5"/>
+                                            </p:txEl>
+                                          </p:spTgt>
+                                        </p:tgtEl>
+                                      </p:cBhvr>
+                                    </p:animEffect>
+                                  </p:childTnLst>
+                                </p:cTn>
+                              </p:par>
+                            </p:childTnLst>
+                          </p:cTn>
+                        </p:par>
+                      </p:childTnLst>
+                    </p:cTn>
+                  </p:par>
+                  <p:par>
+                    <p:cTn id="27" fill="hold">
+                      <p:stCondLst>
+                        <p:cond delay="indefinite"/>
+                      </p:stCondLst>
+                      <p:childTnLst>
+                        <p:par>
+                          <p:cTn id="28" fill="hold">
+                            <p:stCondLst>
+                              <p:cond delay="0"/>
+                            </p:stCondLst>
+                            <p:childTnLst>
+                              <p:par>
+                                <p:cTn id="29" presetID="10" presetClass="entr" presetSubtype="0" fill="hold" grpId="0" nodeType="clickEffect">
+                                  <p:stCondLst>
+                                    <p:cond delay="0"/>
+                                  </p:stCondLst>
+                                  <p:childTnLst>
+                                    <p:set>
+                                      <p:cBhvr>
+                                        <p:cTn id="30" dur="1" fill="hold">
+                                          <p:stCondLst>
+                                            <p:cond delay="0"/>
+                                          </p:stCondLst>
+                                        </p:cTn>
+                                        <p:tgtEl>
+                                          <p:spTgt spid="2">
+                                            <p:txEl>
+                                              <p:pRg st="6" end="6"/>
+                                            </p:txEl>
+                                          </p:spTgt>
+                                        </p:tgtEl>
+                                        <p:attrNameLst>
+                                          <p:attrName>style.visibility</p:attrName>
+                                        </p:attrNameLst>
+                                      </p:cBhvr>
+                                      <p:to>
+                                        <p:strVal val="visible"/>
+                                      </p:to>
+                                    </p:set>
+                                    <p:animEffect transition="in" filter="fade">
+                                      <p:cBhvr>
+                                        <p:cTn id="31" dur="500"/>
+                                        <p:tgtEl>
+                                          <p:spTgt spid="2">
+                                            <p:txEl>
+                                              <p:pRg st="6" end="6"/>
                                             </p:txEl>
                                           </p:spTgt>
                                         </p:tgtEl>

</xml_diff>